<commit_message>
Updated the capstone presentation before we present
</commit_message>
<xml_diff>
--- a/IDC 4942 ~ Capstone/MidtermPresentation.pptx
+++ b/IDC 4942 ~ Capstone/MidtermPresentation.pptx
@@ -2,24 +2,24 @@
 <file path=ppt/presentation.xml><?xml version="1.0" encoding="utf-8"?>
 <p:presentation xmlns:a="http://schemas.openxmlformats.org/drawingml/2006/main" xmlns:r="http://schemas.openxmlformats.org/officeDocument/2006/relationships" xmlns:p="http://schemas.openxmlformats.org/presentationml/2006/main" autoCompressPictures="0">
   <p:sldMasterIdLst>
-    <p:sldMasterId id="2147483696" r:id="rId1"/>
+    <p:sldMasterId id="2147483696" r:id="rId4"/>
   </p:sldMasterIdLst>
   <p:sldIdLst>
-    <p:sldId id="256" r:id="rId2"/>
-    <p:sldId id="257" r:id="rId3"/>
-    <p:sldId id="258" r:id="rId4"/>
-    <p:sldId id="259" r:id="rId5"/>
-    <p:sldId id="260" r:id="rId6"/>
-    <p:sldId id="261" r:id="rId7"/>
-    <p:sldId id="262" r:id="rId8"/>
-    <p:sldId id="263" r:id="rId9"/>
-    <p:sldId id="264" r:id="rId10"/>
-    <p:sldId id="265" r:id="rId11"/>
-    <p:sldId id="266" r:id="rId12"/>
-    <p:sldId id="267" r:id="rId13"/>
-    <p:sldId id="268" r:id="rId14"/>
-    <p:sldId id="269" r:id="rId15"/>
-    <p:sldId id="270" r:id="rId16"/>
+    <p:sldId id="256" r:id="rId5"/>
+    <p:sldId id="257" r:id="rId6"/>
+    <p:sldId id="258" r:id="rId7"/>
+    <p:sldId id="259" r:id="rId8"/>
+    <p:sldId id="260" r:id="rId9"/>
+    <p:sldId id="261" r:id="rId10"/>
+    <p:sldId id="262" r:id="rId11"/>
+    <p:sldId id="263" r:id="rId12"/>
+    <p:sldId id="264" r:id="rId13"/>
+    <p:sldId id="265" r:id="rId14"/>
+    <p:sldId id="266" r:id="rId15"/>
+    <p:sldId id="267" r:id="rId16"/>
+    <p:sldId id="268" r:id="rId17"/>
+    <p:sldId id="269" r:id="rId18"/>
+    <p:sldId id="270" r:id="rId19"/>
   </p:sldIdLst>
   <p:sldSz cx="12192000" cy="6858000"/>
   <p:notesSz cx="6858000" cy="9144000"/>
@@ -118,7 +118,21 @@
       </a:defRPr>
     </a:lvl9pPr>
   </p:defaultTextStyle>
+  <p:extLst>
+    <p:ext uri="{EFAFB233-063F-42B5-8137-9DF3F51BA10A}">
+      <p15:sldGuideLst xmlns:p15="http://schemas.microsoft.com/office/powerpoint/2012/main"/>
+    </p:ext>
+  </p:extLst>
 </p:presentation>
+</file>
+
+<file path=ppt/revisionInfo.xml><?xml version="1.0" encoding="utf-8"?>
+<p1510:revInfo xmlns:a="http://schemas.openxmlformats.org/drawingml/2006/main" xmlns:r="http://schemas.openxmlformats.org/officeDocument/2006/relationships" xmlns:p1510="http://schemas.microsoft.com/office/powerpoint/2015/10/main">
+  <p1510:revLst>
+    <p1510:client id="{83BBC1CB-0900-DD4A-ACC2-923C198BFC54}" v="1" dt="2021-10-18T19:22:17.674"/>
+    <p1510:client id="{CFC73482-BFF0-4C33-894C-9BAF736B41E6}" v="42" dt="2021-10-18T19:21:07.440"/>
+  </p1510:revLst>
+</p1510:revInfo>
 </file>
 
 <file path=ppt/slideLayouts/slideLayout1.xml><?xml version="1.0" encoding="utf-8"?>
@@ -188,7 +202,6 @@
               <a:rPr lang="en-US"/>
               <a:t>Click to edit Master title style</a:t>
             </a:r>
-            <a:endParaRPr lang="en-US" dirty="0"/>
           </a:p>
         </p:txBody>
       </p:sp>
@@ -263,7 +276,6 @@
               <a:rPr lang="en-US"/>
               <a:t>Click to edit Master subtitle style</a:t>
             </a:r>
-            <a:endParaRPr lang="en-US" dirty="0"/>
           </a:p>
         </p:txBody>
       </p:sp>
@@ -286,7 +298,7 @@
               <a:rPr lang="en-US" dirty="0"/>
               <a:t>10/18/21</a:t>
             </a:fld>
-            <a:endParaRPr lang="en-US" dirty="0"/>
+            <a:endParaRPr lang="en-US"/>
           </a:p>
         </p:txBody>
       </p:sp>
@@ -305,7 +317,7 @@
           <a:bodyPr/>
           <a:lstStyle/>
           <a:p>
-            <a:endParaRPr lang="en-US" dirty="0"/>
+            <a:endParaRPr lang="en-US"/>
           </a:p>
         </p:txBody>
       </p:sp>
@@ -329,7 +341,7 @@
               <a:pPr/>
               <a:t>‹#›</a:t>
             </a:fld>
-            <a:endParaRPr lang="en-US" dirty="0"/>
+            <a:endParaRPr lang="en-US"/>
           </a:p>
         </p:txBody>
       </p:sp>
@@ -377,7 +389,6 @@
               <a:rPr lang="en-US"/>
               <a:t>Click to edit Master title style</a:t>
             </a:r>
-            <a:endParaRPr lang="en-US" dirty="0"/>
           </a:p>
         </p:txBody>
       </p:sp>
@@ -429,7 +440,6 @@
               <a:rPr lang="en-US"/>
               <a:t>Fifth level</a:t>
             </a:r>
-            <a:endParaRPr lang="en-US" dirty="0"/>
           </a:p>
         </p:txBody>
       </p:sp>
@@ -452,7 +462,7 @@
               <a:rPr lang="en-US" dirty="0"/>
               <a:t>10/18/21</a:t>
             </a:fld>
-            <a:endParaRPr lang="en-US" dirty="0"/>
+            <a:endParaRPr lang="en-US"/>
           </a:p>
         </p:txBody>
       </p:sp>
@@ -471,7 +481,7 @@
           <a:bodyPr/>
           <a:lstStyle/>
           <a:p>
-            <a:endParaRPr lang="en-US" dirty="0"/>
+            <a:endParaRPr lang="en-US"/>
           </a:p>
         </p:txBody>
       </p:sp>
@@ -494,7 +504,7 @@
               <a:rPr lang="en-US" dirty="0"/>
               <a:t>‹#›</a:t>
             </a:fld>
-            <a:endParaRPr lang="en-US" dirty="0"/>
+            <a:endParaRPr lang="en-US"/>
           </a:p>
         </p:txBody>
       </p:sp>
@@ -547,7 +557,6 @@
               <a:rPr lang="en-US"/>
               <a:t>Click to edit Master title style</a:t>
             </a:r>
-            <a:endParaRPr lang="en-US" dirty="0"/>
           </a:p>
         </p:txBody>
       </p:sp>
@@ -604,7 +613,6 @@
               <a:rPr lang="en-US"/>
               <a:t>Fifth level</a:t>
             </a:r>
-            <a:endParaRPr lang="en-US" dirty="0"/>
           </a:p>
         </p:txBody>
       </p:sp>
@@ -627,7 +635,7 @@
               <a:rPr lang="en-US" dirty="0"/>
               <a:t>10/18/21</a:t>
             </a:fld>
-            <a:endParaRPr lang="en-US" dirty="0"/>
+            <a:endParaRPr lang="en-US"/>
           </a:p>
         </p:txBody>
       </p:sp>
@@ -646,7 +654,7 @@
           <a:bodyPr/>
           <a:lstStyle/>
           <a:p>
-            <a:endParaRPr lang="en-US" dirty="0"/>
+            <a:endParaRPr lang="en-US"/>
           </a:p>
         </p:txBody>
       </p:sp>
@@ -669,7 +677,7 @@
               <a:rPr lang="en-US" dirty="0"/>
               <a:t>‹#›</a:t>
             </a:fld>
-            <a:endParaRPr lang="en-US" dirty="0"/>
+            <a:endParaRPr lang="en-US"/>
           </a:p>
         </p:txBody>
       </p:sp>
@@ -717,7 +725,6 @@
               <a:rPr lang="en-US"/>
               <a:t>Click to edit Master title style</a:t>
             </a:r>
-            <a:endParaRPr lang="en-US" dirty="0"/>
           </a:p>
         </p:txBody>
       </p:sp>
@@ -769,7 +776,6 @@
               <a:rPr lang="en-US"/>
               <a:t>Fifth level</a:t>
             </a:r>
-            <a:endParaRPr lang="en-US" dirty="0"/>
           </a:p>
         </p:txBody>
       </p:sp>
@@ -792,7 +798,7 @@
               <a:rPr lang="en-US" dirty="0"/>
               <a:t>10/18/21</a:t>
             </a:fld>
-            <a:endParaRPr lang="en-US" dirty="0"/>
+            <a:endParaRPr lang="en-US"/>
           </a:p>
         </p:txBody>
       </p:sp>
@@ -811,7 +817,7 @@
           <a:bodyPr/>
           <a:lstStyle/>
           <a:p>
-            <a:endParaRPr lang="en-US" dirty="0"/>
+            <a:endParaRPr lang="en-US"/>
           </a:p>
         </p:txBody>
       </p:sp>
@@ -835,7 +841,7 @@
               <a:pPr/>
               <a:t>‹#›</a:t>
             </a:fld>
-            <a:endParaRPr lang="en-US" dirty="0"/>
+            <a:endParaRPr lang="en-US"/>
           </a:p>
         </p:txBody>
       </p:sp>
@@ -914,7 +920,6 @@
               <a:rPr lang="en-US"/>
               <a:t>Click to edit Master title style</a:t>
             </a:r>
-            <a:endParaRPr lang="en-US" dirty="0"/>
           </a:p>
         </p:txBody>
       </p:sp>
@@ -1056,7 +1061,7 @@
               <a:rPr lang="en-US" dirty="0"/>
               <a:t>10/18/21</a:t>
             </a:fld>
-            <a:endParaRPr lang="en-US" dirty="0"/>
+            <a:endParaRPr lang="en-US"/>
           </a:p>
         </p:txBody>
       </p:sp>
@@ -1075,7 +1080,7 @@
           <a:bodyPr/>
           <a:lstStyle/>
           <a:p>
-            <a:endParaRPr lang="en-US" dirty="0"/>
+            <a:endParaRPr lang="en-US"/>
           </a:p>
         </p:txBody>
       </p:sp>
@@ -1099,7 +1104,7 @@
               <a:pPr/>
               <a:t>‹#›</a:t>
             </a:fld>
-            <a:endParaRPr lang="en-US" dirty="0"/>
+            <a:endParaRPr lang="en-US"/>
           </a:p>
         </p:txBody>
       </p:sp>
@@ -1147,7 +1152,6 @@
               <a:rPr lang="en-US"/>
               <a:t>Click to edit Master title style</a:t>
             </a:r>
-            <a:endParaRPr lang="en-US" dirty="0"/>
           </a:p>
         </p:txBody>
       </p:sp>
@@ -1204,7 +1208,6 @@
               <a:rPr lang="en-US"/>
               <a:t>Fifth level</a:t>
             </a:r>
-            <a:endParaRPr lang="en-US" dirty="0"/>
           </a:p>
         </p:txBody>
       </p:sp>
@@ -1261,7 +1264,6 @@
               <a:rPr lang="en-US"/>
               <a:t>Fifth level</a:t>
             </a:r>
-            <a:endParaRPr lang="en-US" dirty="0"/>
           </a:p>
         </p:txBody>
       </p:sp>
@@ -1284,7 +1286,7 @@
               <a:rPr lang="en-US" dirty="0"/>
               <a:t>10/18/21</a:t>
             </a:fld>
-            <a:endParaRPr lang="en-US" dirty="0"/>
+            <a:endParaRPr lang="en-US"/>
           </a:p>
         </p:txBody>
       </p:sp>
@@ -1303,7 +1305,7 @@
           <a:bodyPr/>
           <a:lstStyle/>
           <a:p>
-            <a:endParaRPr lang="en-US" dirty="0"/>
+            <a:endParaRPr lang="en-US"/>
           </a:p>
         </p:txBody>
       </p:sp>
@@ -1326,7 +1328,7 @@
               <a:rPr lang="en-US" dirty="0"/>
               <a:t>‹#›</a:t>
             </a:fld>
-            <a:endParaRPr lang="en-US" dirty="0"/>
+            <a:endParaRPr lang="en-US"/>
           </a:p>
         </p:txBody>
       </p:sp>
@@ -1481,7 +1483,6 @@
               <a:rPr lang="en-US"/>
               <a:t>Fifth level</a:t>
             </a:r>
-            <a:endParaRPr lang="en-US" dirty="0"/>
           </a:p>
         </p:txBody>
       </p:sp>
@@ -1542,7 +1543,6 @@
               <a:rPr lang="en-US"/>
               <a:t>Fifth level</a:t>
             </a:r>
-            <a:endParaRPr lang="en-US" dirty="0"/>
           </a:p>
         </p:txBody>
       </p:sp>
@@ -1638,7 +1638,7 @@
               <a:rPr lang="en-US" dirty="0"/>
               <a:t>10/18/21</a:t>
             </a:fld>
-            <a:endParaRPr lang="en-US" dirty="0"/>
+            <a:endParaRPr lang="en-US"/>
           </a:p>
         </p:txBody>
       </p:sp>
@@ -1657,7 +1657,7 @@
           <a:bodyPr/>
           <a:lstStyle/>
           <a:p>
-            <a:endParaRPr lang="en-US" dirty="0"/>
+            <a:endParaRPr lang="en-US"/>
           </a:p>
         </p:txBody>
       </p:sp>
@@ -1680,7 +1680,7 @@
               <a:rPr lang="en-US" dirty="0"/>
               <a:t>‹#›</a:t>
             </a:fld>
-            <a:endParaRPr lang="en-US" dirty="0"/>
+            <a:endParaRPr lang="en-US"/>
           </a:p>
         </p:txBody>
       </p:sp>
@@ -1703,7 +1703,6 @@
               <a:rPr lang="en-US"/>
               <a:t>Click to edit Master title style</a:t>
             </a:r>
-            <a:endParaRPr lang="en-US" dirty="0"/>
           </a:p>
         </p:txBody>
       </p:sp>
@@ -1751,7 +1750,6 @@
               <a:rPr lang="en-US"/>
               <a:t>Click to edit Master title style</a:t>
             </a:r>
-            <a:endParaRPr lang="en-US" dirty="0"/>
           </a:p>
         </p:txBody>
       </p:sp>
@@ -1774,7 +1772,7 @@
               <a:rPr lang="en-US" dirty="0"/>
               <a:t>10/18/21</a:t>
             </a:fld>
-            <a:endParaRPr lang="en-US" dirty="0"/>
+            <a:endParaRPr lang="en-US"/>
           </a:p>
         </p:txBody>
       </p:sp>
@@ -1793,7 +1791,7 @@
           <a:bodyPr/>
           <a:lstStyle/>
           <a:p>
-            <a:endParaRPr lang="en-US" dirty="0"/>
+            <a:endParaRPr lang="en-US"/>
           </a:p>
         </p:txBody>
       </p:sp>
@@ -1816,7 +1814,7 @@
               <a:rPr lang="en-US" dirty="0"/>
               <a:t>‹#›</a:t>
             </a:fld>
-            <a:endParaRPr lang="en-US" dirty="0"/>
+            <a:endParaRPr lang="en-US"/>
           </a:p>
         </p:txBody>
       </p:sp>
@@ -1864,7 +1862,7 @@
               <a:rPr lang="en-US" dirty="0"/>
               <a:t>10/18/21</a:t>
             </a:fld>
-            <a:endParaRPr lang="en-US" dirty="0"/>
+            <a:endParaRPr lang="en-US"/>
           </a:p>
         </p:txBody>
       </p:sp>
@@ -1883,7 +1881,7 @@
           <a:bodyPr/>
           <a:lstStyle/>
           <a:p>
-            <a:endParaRPr lang="en-US" dirty="0"/>
+            <a:endParaRPr lang="en-US"/>
           </a:p>
         </p:txBody>
       </p:sp>
@@ -1906,7 +1904,7 @@
               <a:rPr lang="en-US" dirty="0"/>
               <a:t>‹#›</a:t>
             </a:fld>
-            <a:endParaRPr lang="en-US" dirty="0"/>
+            <a:endParaRPr lang="en-US"/>
           </a:p>
         </p:txBody>
       </p:sp>
@@ -2015,7 +2013,6 @@
               <a:rPr lang="en-US"/>
               <a:t>Click to edit Master title style</a:t>
             </a:r>
-            <a:endParaRPr lang="en-US" dirty="0"/>
           </a:p>
         </p:txBody>
       </p:sp>
@@ -2122,7 +2119,6 @@
               <a:rPr lang="en-US"/>
               <a:t>Fifth level</a:t>
             </a:r>
-            <a:endParaRPr lang="en-US" dirty="0"/>
           </a:p>
         </p:txBody>
       </p:sp>
@@ -2216,7 +2212,7 @@
               <a:rPr lang="en-US" dirty="0"/>
               <a:t>10/18/21</a:t>
             </a:fld>
-            <a:endParaRPr lang="en-US" dirty="0"/>
+            <a:endParaRPr lang="en-US"/>
           </a:p>
         </p:txBody>
       </p:sp>
@@ -2250,7 +2246,7 @@
             </a:lvl1pPr>
           </a:lstStyle>
           <a:p>
-            <a:endParaRPr lang="en-US" dirty="0"/>
+            <a:endParaRPr lang="en-US"/>
           </a:p>
         </p:txBody>
       </p:sp>
@@ -2273,7 +2269,7 @@
               <a:rPr lang="en-US" dirty="0"/>
               <a:t>‹#›</a:t>
             </a:fld>
-            <a:endParaRPr lang="en-US" dirty="0"/>
+            <a:endParaRPr lang="en-US"/>
           </a:p>
         </p:txBody>
       </p:sp>
@@ -2382,7 +2378,6 @@
               <a:rPr lang="en-US"/>
               <a:t>Click to edit Master title style</a:t>
             </a:r>
-            <a:endParaRPr lang="en-US" dirty="0"/>
           </a:p>
         </p:txBody>
       </p:sp>
@@ -2459,7 +2454,6 @@
               <a:rPr lang="en-US"/>
               <a:t>Click icon to add picture</a:t>
             </a:r>
-            <a:endParaRPr lang="en-US" dirty="0"/>
           </a:p>
         </p:txBody>
       </p:sp>
@@ -2568,7 +2562,7 @@
               <a:rPr lang="en-US" dirty="0"/>
               <a:t>10/18/21</a:t>
             </a:fld>
-            <a:endParaRPr lang="en-US" dirty="0"/>
+            <a:endParaRPr lang="en-US"/>
           </a:p>
         </p:txBody>
       </p:sp>
@@ -2602,7 +2596,7 @@
             </a:lvl1pPr>
           </a:lstStyle>
           <a:p>
-            <a:endParaRPr lang="en-US" dirty="0"/>
+            <a:endParaRPr lang="en-US"/>
           </a:p>
         </p:txBody>
       </p:sp>
@@ -2625,7 +2619,7 @@
               <a:rPr lang="en-US" dirty="0"/>
               <a:t>‹#›</a:t>
             </a:fld>
-            <a:endParaRPr lang="en-US" dirty="0"/>
+            <a:endParaRPr lang="en-US"/>
           </a:p>
         </p:txBody>
       </p:sp>
@@ -2702,7 +2696,6 @@
               <a:rPr lang="en-US"/>
               <a:t>Click to edit Master title style</a:t>
             </a:r>
-            <a:endParaRPr lang="en-US" dirty="0"/>
           </a:p>
         </p:txBody>
       </p:sp>
@@ -2764,7 +2757,6 @@
               <a:rPr lang="en-US"/>
               <a:t>Fifth level</a:t>
             </a:r>
-            <a:endParaRPr lang="en-US" dirty="0"/>
           </a:p>
         </p:txBody>
       </p:sp>
@@ -2805,7 +2797,7 @@
               <a:rPr lang="en-US" dirty="0"/>
               <a:t>10/18/21</a:t>
             </a:fld>
-            <a:endParaRPr lang="en-US" dirty="0"/>
+            <a:endParaRPr lang="en-US"/>
           </a:p>
         </p:txBody>
       </p:sp>
@@ -2842,7 +2834,7 @@
             </a:lvl1pPr>
           </a:lstStyle>
           <a:p>
-            <a:endParaRPr lang="en-US" dirty="0"/>
+            <a:endParaRPr lang="en-US"/>
           </a:p>
         </p:txBody>
       </p:sp>
@@ -2889,7 +2881,7 @@
               <a:pPr/>
               <a:t>‹#›</a:t>
             </a:fld>
-            <a:endParaRPr lang="en-US" dirty="0"/>
+            <a:endParaRPr lang="en-US"/>
           </a:p>
         </p:txBody>
       </p:sp>
@@ -3636,7 +3628,7 @@
           <a:lstStyle/>
           <a:p>
             <a:r>
-              <a:rPr lang="en-US" sz="2400" dirty="0"/>
+              <a:rPr lang="en-US" sz="2400"/>
               <a:t>Florida Poly</a:t>
             </a:r>
           </a:p>
@@ -3671,7 +3663,7 @@
           <a:lstStyle/>
           <a:p>
             <a:r>
-              <a:rPr lang="en-US" dirty="0">
+              <a:rPr lang="en-US">
                 <a:solidFill>
                   <a:srgbClr val="404040"/>
                 </a:solidFill>
@@ -3682,7 +3674,7 @@
           <a:p>
             <a:pPr lvl="1"/>
             <a:r>
-              <a:rPr lang="en-US" dirty="0">
+              <a:rPr lang="en-US">
                 <a:solidFill>
                   <a:srgbClr val="404040"/>
                 </a:solidFill>
@@ -3693,7 +3685,7 @@
           <a:p>
             <a:pPr lvl="1"/>
             <a:r>
-              <a:rPr lang="en-US" dirty="0">
+              <a:rPr lang="en-US">
                 <a:solidFill>
                   <a:srgbClr val="404040"/>
                 </a:solidFill>
@@ -3704,7 +3696,7 @@
           <a:p>
             <a:pPr lvl="1"/>
             <a:r>
-              <a:rPr lang="en-US" dirty="0">
+              <a:rPr lang="en-US">
                 <a:solidFill>
                   <a:srgbClr val="404040"/>
                 </a:solidFill>
@@ -3714,7 +3706,7 @@
           </a:p>
           <a:p>
             <a:r>
-              <a:rPr lang="en-US" dirty="0">
+              <a:rPr lang="en-US">
                 <a:solidFill>
                   <a:srgbClr val="404040"/>
                 </a:solidFill>
@@ -3725,7 +3717,7 @@
           <a:p>
             <a:pPr lvl="1"/>
             <a:r>
-              <a:rPr lang="en-US" dirty="0">
+              <a:rPr lang="en-US">
                 <a:solidFill>
                   <a:srgbClr val="404040"/>
                 </a:solidFill>
@@ -3736,7 +3728,7 @@
           <a:p>
             <a:pPr lvl="2"/>
             <a:r>
-              <a:rPr lang="en-US" dirty="0">
+              <a:rPr lang="en-US">
                 <a:solidFill>
                   <a:srgbClr val="404040"/>
                 </a:solidFill>
@@ -3747,7 +3739,7 @@
           <a:p>
             <a:pPr lvl="2"/>
             <a:r>
-              <a:rPr lang="en-US" dirty="0">
+              <a:rPr lang="en-US">
                 <a:solidFill>
                   <a:srgbClr val="404040"/>
                 </a:solidFill>
@@ -3758,7 +3750,7 @@
           <a:p>
             <a:pPr lvl="2"/>
             <a:r>
-              <a:rPr lang="en-US" dirty="0">
+              <a:rPr lang="en-US">
                 <a:solidFill>
                   <a:srgbClr val="404040"/>
                 </a:solidFill>
@@ -4028,7 +4020,7 @@
           <a:lstStyle/>
           <a:p>
             <a:r>
-              <a:rPr lang="en-US" sz="2400" dirty="0"/>
+              <a:rPr lang="en-US" sz="2400"/>
               <a:t>TMH</a:t>
             </a:r>
           </a:p>
@@ -4063,7 +4055,7 @@
           <a:lstStyle/>
           <a:p>
             <a:r>
-              <a:rPr lang="en-US" dirty="0">
+              <a:rPr lang="en-US">
                 <a:solidFill>
                   <a:srgbClr val="404040"/>
                 </a:solidFill>
@@ -4074,7 +4066,7 @@
           <a:p>
             <a:pPr lvl="1"/>
             <a:r>
-              <a:rPr lang="en-US" dirty="0">
+              <a:rPr lang="en-US">
                 <a:solidFill>
                   <a:srgbClr val="404040"/>
                 </a:solidFill>
@@ -4085,7 +4077,7 @@
           <a:p>
             <a:pPr lvl="1"/>
             <a:r>
-              <a:rPr lang="en-US" dirty="0">
+              <a:rPr lang="en-US">
                 <a:solidFill>
                   <a:srgbClr val="404040"/>
                 </a:solidFill>
@@ -4095,7 +4087,7 @@
           </a:p>
           <a:p>
             <a:r>
-              <a:rPr lang="en-US" dirty="0">
+              <a:rPr lang="en-US">
                 <a:solidFill>
                   <a:srgbClr val="404040"/>
                 </a:solidFill>
@@ -4106,7 +4098,7 @@
           <a:p>
             <a:pPr lvl="1"/>
             <a:r>
-              <a:rPr lang="en-US" dirty="0">
+              <a:rPr lang="en-US">
                 <a:solidFill>
                   <a:srgbClr val="404040"/>
                 </a:solidFill>
@@ -4117,7 +4109,7 @@
           <a:p>
             <a:pPr lvl="1"/>
             <a:r>
-              <a:rPr lang="en-US" dirty="0">
+              <a:rPr lang="en-US">
                 <a:solidFill>
                   <a:srgbClr val="404040"/>
                 </a:solidFill>
@@ -4179,7 +4171,7 @@
           <a:lstStyle/>
           <a:p>
             <a:r>
-              <a:rPr lang="en-US" dirty="0"/>
+              <a:rPr lang="en-US"/>
               <a:t>Tasks to be completed</a:t>
             </a:r>
           </a:p>
@@ -4470,7 +4462,7 @@
           <a:lstStyle/>
           <a:p>
             <a:r>
-              <a:rPr lang="en-US" sz="2400" dirty="0"/>
+              <a:rPr lang="en-US" sz="2400"/>
               <a:t>Florida Poly</a:t>
             </a:r>
           </a:p>
@@ -4499,13 +4491,13 @@
           </a:xfrm>
         </p:spPr>
         <p:txBody>
-          <a:bodyPr>
+          <a:bodyPr vert="horz" lIns="91440" tIns="45720" rIns="91440" bIns="45720" rtlCol="0" anchor="t">
             <a:normAutofit/>
           </a:bodyPr>
           <a:lstStyle/>
           <a:p>
             <a:r>
-              <a:rPr lang="en-US" dirty="0">
+              <a:rPr lang="en-US">
                 <a:solidFill>
                   <a:srgbClr val="404040"/>
                 </a:solidFill>
@@ -4515,7 +4507,7 @@
           </a:p>
           <a:p>
             <a:r>
-              <a:rPr lang="en-US" dirty="0">
+              <a:rPr lang="en-US">
                 <a:solidFill>
                   <a:srgbClr val="404040"/>
                 </a:solidFill>
@@ -4525,7 +4517,7 @@
           </a:p>
           <a:p>
             <a:r>
-              <a:rPr lang="en-US" dirty="0">
+              <a:rPr lang="en-US">
                 <a:solidFill>
                   <a:srgbClr val="404040"/>
                 </a:solidFill>
@@ -4534,7 +4526,17 @@
             </a:r>
           </a:p>
           <a:p>
-            <a:endParaRPr lang="en-US" dirty="0">
+            <a:r>
+              <a:rPr lang="en-US">
+                <a:solidFill>
+                  <a:srgbClr val="404040"/>
+                </a:solidFill>
+              </a:rPr>
+              <a:t>Conduct literature review of similar research</a:t>
+            </a:r>
+          </a:p>
+          <a:p>
+            <a:endParaRPr lang="en-US">
               <a:solidFill>
                 <a:srgbClr val="404040"/>
               </a:solidFill>
@@ -4542,7 +4544,7 @@
           </a:p>
           <a:p>
             <a:r>
-              <a:rPr lang="en-US" dirty="0">
+              <a:rPr lang="en-US">
                 <a:solidFill>
                   <a:srgbClr val="404040"/>
                 </a:solidFill>
@@ -4812,7 +4814,7 @@
           <a:lstStyle/>
           <a:p>
             <a:r>
-              <a:rPr lang="en-US" sz="2400" dirty="0"/>
+              <a:rPr lang="en-US" sz="2400"/>
               <a:t>TMH</a:t>
             </a:r>
           </a:p>
@@ -4847,7 +4849,7 @@
           <a:lstStyle/>
           <a:p>
             <a:r>
-              <a:rPr lang="en-US" dirty="0">
+              <a:rPr lang="en-US">
                 <a:solidFill>
                   <a:srgbClr val="404040"/>
                 </a:solidFill>
@@ -4857,7 +4859,7 @@
           </a:p>
           <a:p>
             <a:r>
-              <a:rPr lang="en-US" dirty="0">
+              <a:rPr lang="en-US">
                 <a:solidFill>
                   <a:srgbClr val="404040"/>
                 </a:solidFill>
@@ -4867,7 +4869,7 @@
           </a:p>
           <a:p>
             <a:r>
-              <a:rPr lang="en-US" dirty="0">
+              <a:rPr lang="en-US">
                 <a:solidFill>
                   <a:srgbClr val="404040"/>
                 </a:solidFill>
@@ -5083,7 +5085,7 @@
           <a:lstStyle/>
           <a:p>
             <a:r>
-              <a:rPr lang="en-US" dirty="0"/>
+              <a:rPr lang="en-US"/>
               <a:t>Project Background</a:t>
             </a:r>
           </a:p>
@@ -5374,7 +5376,7 @@
           <a:lstStyle/>
           <a:p>
             <a:r>
-              <a:rPr lang="en-US" dirty="0"/>
+              <a:rPr lang="en-US"/>
               <a:t>TMH Quick Facts</a:t>
             </a:r>
           </a:p>
@@ -5409,7 +5411,7 @@
           <a:lstStyle/>
           <a:p>
             <a:r>
-              <a:rPr lang="en-US" dirty="0">
+              <a:rPr lang="en-US">
                 <a:solidFill>
                   <a:srgbClr val="404040"/>
                 </a:solidFill>
@@ -5419,7 +5421,7 @@
           </a:p>
           <a:p>
             <a:r>
-              <a:rPr lang="en-US" dirty="0">
+              <a:rPr lang="en-US">
                 <a:solidFill>
                   <a:srgbClr val="404040"/>
                 </a:solidFill>
@@ -5429,7 +5431,7 @@
           </a:p>
           <a:p>
             <a:r>
-              <a:rPr lang="en-US" dirty="0">
+              <a:rPr lang="en-US">
                 <a:solidFill>
                   <a:srgbClr val="404040"/>
                 </a:solidFill>
@@ -5438,7 +5440,7 @@
             </a:r>
           </a:p>
           <a:p>
-            <a:endParaRPr lang="en-US" dirty="0">
+            <a:endParaRPr lang="en-US">
               <a:solidFill>
                 <a:srgbClr val="404040"/>
               </a:solidFill>
@@ -5706,7 +5708,7 @@
           <a:lstStyle/>
           <a:p>
             <a:r>
-              <a:rPr lang="en-US" sz="2400" dirty="0"/>
+              <a:rPr lang="en-US" sz="2400"/>
               <a:t>Patient Discharge Follow-up Process</a:t>
             </a:r>
           </a:p>
@@ -5745,7 +5747,7 @@
               <a:buAutoNum type="arabicPeriod"/>
             </a:pPr>
             <a:r>
-              <a:rPr lang="en-US" dirty="0">
+              <a:rPr lang="en-US">
                 <a:solidFill>
                   <a:srgbClr val="404040"/>
                 </a:solidFill>
@@ -5759,7 +5761,7 @@
               <a:buAutoNum type="arabicPeriod"/>
             </a:pPr>
             <a:r>
-              <a:rPr lang="en-US" dirty="0">
+              <a:rPr lang="en-US">
                 <a:solidFill>
                   <a:srgbClr val="404040"/>
                 </a:solidFill>
@@ -5773,7 +5775,7 @@
               <a:buAutoNum type="arabicPeriod"/>
             </a:pPr>
             <a:r>
-              <a:rPr lang="en-US" dirty="0">
+              <a:rPr lang="en-US">
                 <a:solidFill>
                   <a:srgbClr val="404040"/>
                 </a:solidFill>
@@ -5787,7 +5789,7 @@
               <a:buAutoNum type="arabicPeriod"/>
             </a:pPr>
             <a:r>
-              <a:rPr lang="en-US" dirty="0">
+              <a:rPr lang="en-US">
                 <a:solidFill>
                   <a:srgbClr val="404040"/>
                 </a:solidFill>
@@ -5849,7 +5851,7 @@
           <a:lstStyle/>
           <a:p>
             <a:r>
-              <a:rPr lang="en-US" dirty="0"/>
+              <a:rPr lang="en-US"/>
               <a:t>Project questions</a:t>
             </a:r>
           </a:p>
@@ -6305,7 +6307,7 @@
           <a:lstStyle/>
           <a:p>
             <a:r>
-              <a:rPr lang="en-US" sz="3200" dirty="0"/>
+              <a:rPr lang="en-US" sz="3200"/>
               <a:t>Can we identify patient response characteristics that are more likely to lead to readmission?</a:t>
             </a:r>
           </a:p>
@@ -6536,7 +6538,7 @@
           <a:lstStyle/>
           <a:p>
             <a:r>
-              <a:rPr lang="en-US" sz="2400" dirty="0"/>
+              <a:rPr lang="en-US" sz="2400"/>
               <a:t>Can we correlate patient response characteristics and diagnosis or unit?</a:t>
             </a:r>
           </a:p>
@@ -6629,7 +6631,7 @@
           <a:lstStyle/>
           <a:p>
             <a:r>
-              <a:rPr lang="en-US" dirty="0"/>
+              <a:rPr lang="en-US"/>
               <a:t>Tasks completed</a:t>
             </a:r>
           </a:p>
@@ -6931,4 +6933,193 @@
     </a:ext>
   </a:extLst>
 </a:theme>
+</file>
+
+<file path=customXml/item1.xml><?xml version="1.0" encoding="utf-8"?>
+<ct:contentTypeSchema xmlns:ct="http://schemas.microsoft.com/office/2006/metadata/contentType" xmlns:ma="http://schemas.microsoft.com/office/2006/metadata/properties/metaAttributes" ct:_="" ma:_="" ma:contentTypeName="Document" ma:contentTypeID="0x01010098C2BA364F93A046998B1C38E032169E" ma:contentTypeVersion="2" ma:contentTypeDescription="Create a new document." ma:contentTypeScope="" ma:versionID="ab6f7be23c30548dd496b12d40e56b0e">
+  <xsd:schema xmlns:xsd="http://www.w3.org/2001/XMLSchema" xmlns:xs="http://www.w3.org/2001/XMLSchema" xmlns:p="http://schemas.microsoft.com/office/2006/metadata/properties" xmlns:ns2="5ccbf36f-62a2-437b-b88b-0620d7a891d8" targetNamespace="http://schemas.microsoft.com/office/2006/metadata/properties" ma:root="true" ma:fieldsID="b402442e67d956f5ef94921da9f767dc" ns2:_="">
+    <xsd:import namespace="5ccbf36f-62a2-437b-b88b-0620d7a891d8"/>
+    <xsd:element name="properties">
+      <xsd:complexType>
+        <xsd:sequence>
+          <xsd:element name="documentManagement">
+            <xsd:complexType>
+              <xsd:all>
+                <xsd:element ref="ns2:MediaServiceMetadata" minOccurs="0"/>
+                <xsd:element ref="ns2:MediaServiceFastMetadata" minOccurs="0"/>
+              </xsd:all>
+            </xsd:complexType>
+          </xsd:element>
+        </xsd:sequence>
+      </xsd:complexType>
+    </xsd:element>
+  </xsd:schema>
+  <xsd:schema xmlns:xsd="http://www.w3.org/2001/XMLSchema" xmlns:xs="http://www.w3.org/2001/XMLSchema" xmlns:dms="http://schemas.microsoft.com/office/2006/documentManagement/types" xmlns:pc="http://schemas.microsoft.com/office/infopath/2007/PartnerControls" targetNamespace="5ccbf36f-62a2-437b-b88b-0620d7a891d8" elementFormDefault="qualified">
+    <xsd:import namespace="http://schemas.microsoft.com/office/2006/documentManagement/types"/>
+    <xsd:import namespace="http://schemas.microsoft.com/office/infopath/2007/PartnerControls"/>
+    <xsd:element name="MediaServiceMetadata" ma:index="8" nillable="true" ma:displayName="MediaServiceMetadata" ma:hidden="true" ma:internalName="MediaServiceMetadata" ma:readOnly="true">
+      <xsd:simpleType>
+        <xsd:restriction base="dms:Note"/>
+      </xsd:simpleType>
+    </xsd:element>
+    <xsd:element name="MediaServiceFastMetadata" ma:index="9" nillable="true" ma:displayName="MediaServiceFastMetadata" ma:hidden="true" ma:internalName="MediaServiceFastMetadata" ma:readOnly="true">
+      <xsd:simpleType>
+        <xsd:restriction base="dms:Note"/>
+      </xsd:simpleType>
+    </xsd:element>
+  </xsd:schema>
+  <xsd:schema xmlns="http://schemas.openxmlformats.org/package/2006/metadata/core-properties" xmlns:xsd="http://www.w3.org/2001/XMLSchema" xmlns:xsi="http://www.w3.org/2001/XMLSchema-instance" xmlns:dc="http://purl.org/dc/elements/1.1/" xmlns:dcterms="http://purl.org/dc/terms/" xmlns:odoc="http://schemas.microsoft.com/internal/obd" targetNamespace="http://schemas.openxmlformats.org/package/2006/metadata/core-properties" elementFormDefault="qualified" attributeFormDefault="unqualified" blockDefault="#all">
+    <xsd:import namespace="http://purl.org/dc/elements/1.1/" schemaLocation="http://dublincore.org/schemas/xmls/qdc/2003/04/02/dc.xsd"/>
+    <xsd:import namespace="http://purl.org/dc/terms/" schemaLocation="http://dublincore.org/schemas/xmls/qdc/2003/04/02/dcterms.xsd"/>
+    <xsd:element name="coreProperties" type="CT_coreProperties"/>
+    <xsd:complexType name="CT_coreProperties">
+      <xsd:all>
+        <xsd:element ref="dc:creator" minOccurs="0" maxOccurs="1"/>
+        <xsd:element ref="dcterms:created" minOccurs="0" maxOccurs="1"/>
+        <xsd:element ref="dc:identifier" minOccurs="0" maxOccurs="1"/>
+        <xsd:element name="contentType" minOccurs="0" maxOccurs="1" type="xsd:string" ma:index="0" ma:displayName="Content Type"/>
+        <xsd:element ref="dc:title" minOccurs="0" maxOccurs="1" ma:index="4" ma:displayName="Title"/>
+        <xsd:element ref="dc:subject" minOccurs="0" maxOccurs="1"/>
+        <xsd:element ref="dc:description" minOccurs="0" maxOccurs="1"/>
+        <xsd:element name="keywords" minOccurs="0" maxOccurs="1" type="xsd:string"/>
+        <xsd:element ref="dc:language" minOccurs="0" maxOccurs="1"/>
+        <xsd:element name="category" minOccurs="0" maxOccurs="1" type="xsd:string"/>
+        <xsd:element name="version" minOccurs="0" maxOccurs="1" type="xsd:string"/>
+        <xsd:element name="revision" minOccurs="0" maxOccurs="1" type="xsd:string">
+          <xsd:annotation>
+            <xsd:documentation>
+                        This value indicates the number of saves or revisions. The application is responsible for updating this value after each revision.
+                    </xsd:documentation>
+          </xsd:annotation>
+        </xsd:element>
+        <xsd:element name="lastModifiedBy" minOccurs="0" maxOccurs="1" type="xsd:string"/>
+        <xsd:element ref="dcterms:modified" minOccurs="0" maxOccurs="1"/>
+        <xsd:element name="contentStatus" minOccurs="0" maxOccurs="1" type="xsd:string"/>
+      </xsd:all>
+    </xsd:complexType>
+  </xsd:schema>
+  <xs:schema xmlns:pc="http://schemas.microsoft.com/office/infopath/2007/PartnerControls" xmlns:xs="http://www.w3.org/2001/XMLSchema" targetNamespace="http://schemas.microsoft.com/office/infopath/2007/PartnerControls" elementFormDefault="qualified" attributeFormDefault="unqualified">
+    <xs:element name="Person">
+      <xs:complexType>
+        <xs:sequence>
+          <xs:element ref="pc:DisplayName" minOccurs="0"/>
+          <xs:element ref="pc:AccountId" minOccurs="0"/>
+          <xs:element ref="pc:AccountType" minOccurs="0"/>
+        </xs:sequence>
+      </xs:complexType>
+    </xs:element>
+    <xs:element name="DisplayName" type="xs:string"/>
+    <xs:element name="AccountId" type="xs:string"/>
+    <xs:element name="AccountType" type="xs:string"/>
+    <xs:element name="BDCAssociatedEntity">
+      <xs:complexType>
+        <xs:sequence>
+          <xs:element ref="pc:BDCEntity" minOccurs="0" maxOccurs="unbounded"/>
+        </xs:sequence>
+        <xs:attribute ref="pc:EntityNamespace"/>
+        <xs:attribute ref="pc:EntityName"/>
+        <xs:attribute ref="pc:SystemInstanceName"/>
+        <xs:attribute ref="pc:AssociationName"/>
+      </xs:complexType>
+    </xs:element>
+    <xs:attribute name="EntityNamespace" type="xs:string"/>
+    <xs:attribute name="EntityName" type="xs:string"/>
+    <xs:attribute name="SystemInstanceName" type="xs:string"/>
+    <xs:attribute name="AssociationName" type="xs:string"/>
+    <xs:element name="BDCEntity">
+      <xs:complexType>
+        <xs:sequence>
+          <xs:element ref="pc:EntityDisplayName" minOccurs="0"/>
+          <xs:element ref="pc:EntityInstanceReference" minOccurs="0"/>
+          <xs:element ref="pc:EntityId1" minOccurs="0"/>
+          <xs:element ref="pc:EntityId2" minOccurs="0"/>
+          <xs:element ref="pc:EntityId3" minOccurs="0"/>
+          <xs:element ref="pc:EntityId4" minOccurs="0"/>
+          <xs:element ref="pc:EntityId5" minOccurs="0"/>
+        </xs:sequence>
+      </xs:complexType>
+    </xs:element>
+    <xs:element name="EntityDisplayName" type="xs:string"/>
+    <xs:element name="EntityInstanceReference" type="xs:string"/>
+    <xs:element name="EntityId1" type="xs:string"/>
+    <xs:element name="EntityId2" type="xs:string"/>
+    <xs:element name="EntityId3" type="xs:string"/>
+    <xs:element name="EntityId4" type="xs:string"/>
+    <xs:element name="EntityId5" type="xs:string"/>
+    <xs:element name="Terms">
+      <xs:complexType>
+        <xs:sequence>
+          <xs:element ref="pc:TermInfo" minOccurs="0" maxOccurs="unbounded"/>
+        </xs:sequence>
+      </xs:complexType>
+    </xs:element>
+    <xs:element name="TermInfo">
+      <xs:complexType>
+        <xs:sequence>
+          <xs:element ref="pc:TermName" minOccurs="0"/>
+          <xs:element ref="pc:TermId" minOccurs="0"/>
+        </xs:sequence>
+      </xs:complexType>
+    </xs:element>
+    <xs:element name="TermName" type="xs:string"/>
+    <xs:element name="TermId" type="xs:string"/>
+  </xs:schema>
+</ct:contentTypeSchema>
+</file>
+
+<file path=customXml/item2.xml><?xml version="1.0" encoding="utf-8"?>
+<?mso-contentType ?>
+<FormTemplates xmlns="http://schemas.microsoft.com/sharepoint/v3/contenttype/forms">
+  <Display>DocumentLibraryForm</Display>
+  <Edit>DocumentLibraryForm</Edit>
+  <New>DocumentLibraryForm</New>
+</FormTemplates>
+</file>
+
+<file path=customXml/item3.xml><?xml version="1.0" encoding="utf-8"?>
+<p:properties xmlns:p="http://schemas.microsoft.com/office/2006/metadata/properties" xmlns:xsi="http://www.w3.org/2001/XMLSchema-instance" xmlns:pc="http://schemas.microsoft.com/office/infopath/2007/PartnerControls">
+  <documentManagement/>
+</p:properties>
+</file>
+
+<file path=customXml/itemProps1.xml><?xml version="1.0" encoding="utf-8"?>
+<ds:datastoreItem xmlns:ds="http://schemas.openxmlformats.org/officeDocument/2006/customXml" ds:itemID="{1D0A73FC-E577-4D3F-B08A-D3341121F4E0}">
+  <ds:schemaRefs>
+    <ds:schemaRef ds:uri="5ccbf36f-62a2-437b-b88b-0620d7a891d8"/>
+    <ds:schemaRef ds:uri="http://purl.org/dc/elements/1.1/"/>
+    <ds:schemaRef ds:uri="http://purl.org/dc/terms/"/>
+    <ds:schemaRef ds:uri="http://schemas.microsoft.com/internal/obd"/>
+    <ds:schemaRef ds:uri="http://schemas.microsoft.com/office/2006/documentManagement/types"/>
+    <ds:schemaRef ds:uri="http://schemas.microsoft.com/office/2006/metadata/contentType"/>
+    <ds:schemaRef ds:uri="http://schemas.microsoft.com/office/2006/metadata/properties"/>
+    <ds:schemaRef ds:uri="http://schemas.microsoft.com/office/2006/metadata/properties/metaAttributes"/>
+    <ds:schemaRef ds:uri="http://schemas.microsoft.com/office/infopath/2007/PartnerControls"/>
+    <ds:schemaRef ds:uri="http://schemas.openxmlformats.org/package/2006/metadata/core-properties"/>
+    <ds:schemaRef ds:uri="http://www.w3.org/2001/XMLSchema"/>
+  </ds:schemaRefs>
+</ds:datastoreItem>
+</file>
+
+<file path=customXml/itemProps2.xml><?xml version="1.0" encoding="utf-8"?>
+<ds:datastoreItem xmlns:ds="http://schemas.openxmlformats.org/officeDocument/2006/customXml" ds:itemID="{BA0EC30D-B2F4-4B22-A293-484DA3593D66}">
+  <ds:schemaRefs>
+    <ds:schemaRef ds:uri="http://schemas.microsoft.com/sharepoint/v3/contenttype/forms"/>
+  </ds:schemaRefs>
+</ds:datastoreItem>
+</file>
+
+<file path=customXml/itemProps3.xml><?xml version="1.0" encoding="utf-8"?>
+<ds:datastoreItem xmlns:ds="http://schemas.openxmlformats.org/officeDocument/2006/customXml" ds:itemID="{36BB1F44-0AC4-4597-817B-96818129DDD0}">
+  <ds:schemaRefs>
+    <ds:schemaRef ds:uri="5ccbf36f-62a2-437b-b88b-0620d7a891d8"/>
+    <ds:schemaRef ds:uri="http://purl.org/dc/dcmitype/"/>
+    <ds:schemaRef ds:uri="http://purl.org/dc/elements/1.1/"/>
+    <ds:schemaRef ds:uri="http://purl.org/dc/terms/"/>
+    <ds:schemaRef ds:uri="http://schemas.microsoft.com/office/2006/documentManagement/types"/>
+    <ds:schemaRef ds:uri="http://schemas.microsoft.com/office/2006/metadata/properties"/>
+    <ds:schemaRef ds:uri="http://schemas.microsoft.com/office/infopath/2007/PartnerControls"/>
+    <ds:schemaRef ds:uri="http://schemas.openxmlformats.org/package/2006/metadata/core-properties"/>
+    <ds:schemaRef ds:uri="http://www.w3.org/XML/1998/namespace"/>
+  </ds:schemaRefs>
+</ds:datastoreItem>
 </file>
</xml_diff>

<commit_message>
Updated midterm presentation for capstone
</commit_message>
<xml_diff>
--- a/IDC 4942 ~ Capstone/MidtermPresentation.pptx
+++ b/IDC 4942 ~ Capstone/MidtermPresentation.pptx
@@ -19,7 +19,7 @@
     <p:sldId id="267" r:id="rId16"/>
     <p:sldId id="268" r:id="rId17"/>
     <p:sldId id="269" r:id="rId18"/>
-    <p:sldId id="270" r:id="rId19"/>
+    <p:sldId id="271" r:id="rId19"/>
   </p:sldIdLst>
   <p:sldSz cx="12192000" cy="6858000"/>
   <p:notesSz cx="6858000" cy="9144000"/>
@@ -3358,16 +3358,167 @@
           <a:lstStyle/>
           <a:p>
             <a:r>
-              <a:rPr lang="en-US">
+              <a:rPr lang="en-US" sz="1800">
                 <a:solidFill>
                   <a:schemeClr val="tx1"/>
                 </a:solidFill>
               </a:rPr>
               <a:t>The Three Musketeers: Hailey Skoglund, Gus Lipkin, Maverick Hope</a:t>
             </a:r>
-          </a:p>
-        </p:txBody>
-      </p:sp>
+            <a:endParaRPr lang="en-US" sz="1800" dirty="0">
+              <a:solidFill>
+                <a:schemeClr val="tx1"/>
+              </a:solidFill>
+            </a:endParaRPr>
+          </a:p>
+        </p:txBody>
+      </p:sp>
+      <p:sp>
+        <p:nvSpPr>
+          <p:cNvPr id="4" name="Rectangle 3">
+            <a:extLst>
+              <a:ext uri="{FF2B5EF4-FFF2-40B4-BE49-F238E27FC236}">
+                <a16:creationId xmlns:a16="http://schemas.microsoft.com/office/drawing/2014/main" id="{128B8A4C-ADF3-CC49-B361-B65BE5EE6935}"/>
+              </a:ext>
+            </a:extLst>
+          </p:cNvPr>
+          <p:cNvSpPr/>
+          <p:nvPr/>
+        </p:nvSpPr>
+        <p:spPr>
+          <a:xfrm>
+            <a:off x="1" y="5470108"/>
+            <a:ext cx="12191980" cy="1387892"/>
+          </a:xfrm>
+          <a:prstGeom prst="rect">
+            <a:avLst/>
+          </a:prstGeom>
+          <a:solidFill>
+            <a:schemeClr val="accent6"/>
+          </a:solidFill>
+          <a:ln>
+            <a:noFill/>
+          </a:ln>
+        </p:spPr>
+        <p:style>
+          <a:lnRef idx="2">
+            <a:schemeClr val="accent1">
+              <a:shade val="50000"/>
+            </a:schemeClr>
+          </a:lnRef>
+          <a:fillRef idx="1">
+            <a:schemeClr val="accent1"/>
+          </a:fillRef>
+          <a:effectRef idx="0">
+            <a:schemeClr val="accent1"/>
+          </a:effectRef>
+          <a:fontRef idx="minor">
+            <a:schemeClr val="lt1"/>
+          </a:fontRef>
+        </p:style>
+        <p:txBody>
+          <a:bodyPr rtlCol="0" anchor="ctr"/>
+          <a:lstStyle/>
+          <a:p>
+            <a:pPr algn="ctr"/>
+            <a:endParaRPr lang="en-US"/>
+          </a:p>
+        </p:txBody>
+      </p:sp>
+      <p:pic>
+        <p:nvPicPr>
+          <p:cNvPr id="1026" name="Picture 2" descr="Using Telehealth to Power Patient-Centered Care">
+            <a:extLst>
+              <a:ext uri="{FF2B5EF4-FFF2-40B4-BE49-F238E27FC236}">
+                <a16:creationId xmlns:a16="http://schemas.microsoft.com/office/drawing/2014/main" id="{8183EF0B-7150-544D-9D9D-412DE21919EA}"/>
+              </a:ext>
+            </a:extLst>
+          </p:cNvPr>
+          <p:cNvPicPr>
+            <a:picLocks noChangeAspect="1" noChangeArrowheads="1"/>
+          </p:cNvPicPr>
+          <p:nvPr/>
+        </p:nvPicPr>
+        <p:blipFill>
+          <a:blip r:embed="rId3">
+            <a:extLst>
+              <a:ext uri="{28A0092B-C50C-407E-A947-70E740481C1C}">
+                <a14:useLocalDpi xmlns:a14="http://schemas.microsoft.com/office/drawing/2010/main" val="0"/>
+              </a:ext>
+            </a:extLst>
+          </a:blip>
+          <a:srcRect/>
+          <a:stretch>
+            <a:fillRect/>
+          </a:stretch>
+        </p:blipFill>
+        <p:spPr bwMode="auto">
+          <a:xfrm>
+            <a:off x="7698494" y="5470108"/>
+            <a:ext cx="3593648" cy="1387891"/>
+          </a:xfrm>
+          <a:prstGeom prst="rect">
+            <a:avLst/>
+          </a:prstGeom>
+          <a:noFill/>
+          <a:extLst>
+            <a:ext uri="{909E8E84-426E-40DD-AFC4-6F175D3DCCD1}">
+              <a14:hiddenFill xmlns:a14="http://schemas.microsoft.com/office/drawing/2010/main">
+                <a:solidFill>
+                  <a:srgbClr val="FFFFFF"/>
+                </a:solidFill>
+              </a14:hiddenFill>
+            </a:ext>
+          </a:extLst>
+        </p:spPr>
+      </p:pic>
+      <p:pic>
+        <p:nvPicPr>
+          <p:cNvPr id="1028" name="Picture 4" descr="Download Florida Polytechnic Logo PNG Image with No Background - PNGkey.com">
+            <a:extLst>
+              <a:ext uri="{FF2B5EF4-FFF2-40B4-BE49-F238E27FC236}">
+                <a16:creationId xmlns:a16="http://schemas.microsoft.com/office/drawing/2014/main" id="{4AA15C22-74ED-CF43-8990-3FDB51A26F9F}"/>
+              </a:ext>
+            </a:extLst>
+          </p:cNvPr>
+          <p:cNvPicPr>
+            <a:picLocks noChangeAspect="1" noChangeArrowheads="1"/>
+          </p:cNvPicPr>
+          <p:nvPr/>
+        </p:nvPicPr>
+        <p:blipFill>
+          <a:blip r:embed="rId4">
+            <a:extLst>
+              <a:ext uri="{28A0092B-C50C-407E-A947-70E740481C1C}">
+                <a14:useLocalDpi xmlns:a14="http://schemas.microsoft.com/office/drawing/2010/main" val="0"/>
+              </a:ext>
+            </a:extLst>
+          </a:blip>
+          <a:srcRect/>
+          <a:stretch>
+            <a:fillRect/>
+          </a:stretch>
+        </p:blipFill>
+        <p:spPr bwMode="auto">
+          <a:xfrm>
+            <a:off x="1154349" y="5569543"/>
+            <a:ext cx="4903391" cy="1189022"/>
+          </a:xfrm>
+          <a:prstGeom prst="rect">
+            <a:avLst/>
+          </a:prstGeom>
+          <a:noFill/>
+          <a:extLst>
+            <a:ext uri="{909E8E84-426E-40DD-AFC4-6F175D3DCCD1}">
+              <a14:hiddenFill xmlns:a14="http://schemas.microsoft.com/office/drawing/2010/main">
+                <a:solidFill>
+                  <a:srgbClr val="FFFFFF"/>
+                </a:solidFill>
+              </a14:hiddenFill>
+            </a:ext>
+          </a:extLst>
+        </p:spPr>
+      </p:pic>
     </p:spTree>
     <p:extLst>
       <p:ext uri="{BB962C8B-B14F-4D97-AF65-F5344CB8AC3E}">
@@ -3378,6 +3529,14 @@
   <p:clrMapOvr>
     <a:masterClrMapping/>
   </p:clrMapOvr>
+  <mc:AlternateContent xmlns:mc="http://schemas.openxmlformats.org/markup-compatibility/2006">
+    <mc:Choice xmlns:p14="http://schemas.microsoft.com/office/powerpoint/2010/main" Requires="p14">
+      <p:transition spd="slow" p14:dur="2000" advClick="0"/>
+    </mc:Choice>
+    <mc:Fallback>
+      <p:transition spd="slow" advClick="0"/>
+    </mc:Fallback>
+  </mc:AlternateContent>
 </p:sld>
 </file>
 
@@ -5023,26 +5182,185 @@
           <a:lstStyle/>
           <a:p>
             <a:r>
-              <a:rPr lang="en-US">
+              <a:rPr lang="en-US" sz="1800">
                 <a:solidFill>
                   <a:schemeClr val="tx1"/>
                 </a:solidFill>
               </a:rPr>
               <a:t>The Three Musketeers: Hailey Skoglund, Gus Lipkin, Maverick Hope</a:t>
             </a:r>
-          </a:p>
-        </p:txBody>
-      </p:sp>
+            <a:endParaRPr lang="en-US" sz="1800" dirty="0">
+              <a:solidFill>
+                <a:schemeClr val="tx1"/>
+              </a:solidFill>
+            </a:endParaRPr>
+          </a:p>
+        </p:txBody>
+      </p:sp>
+      <p:sp>
+        <p:nvSpPr>
+          <p:cNvPr id="4" name="Rectangle 3">
+            <a:extLst>
+              <a:ext uri="{FF2B5EF4-FFF2-40B4-BE49-F238E27FC236}">
+                <a16:creationId xmlns:a16="http://schemas.microsoft.com/office/drawing/2014/main" id="{128B8A4C-ADF3-CC49-B361-B65BE5EE6935}"/>
+              </a:ext>
+            </a:extLst>
+          </p:cNvPr>
+          <p:cNvSpPr/>
+          <p:nvPr/>
+        </p:nvSpPr>
+        <p:spPr>
+          <a:xfrm>
+            <a:off x="1" y="5470108"/>
+            <a:ext cx="12191980" cy="1387892"/>
+          </a:xfrm>
+          <a:prstGeom prst="rect">
+            <a:avLst/>
+          </a:prstGeom>
+          <a:solidFill>
+            <a:schemeClr val="accent6"/>
+          </a:solidFill>
+          <a:ln>
+            <a:noFill/>
+          </a:ln>
+        </p:spPr>
+        <p:style>
+          <a:lnRef idx="2">
+            <a:schemeClr val="accent1">
+              <a:shade val="50000"/>
+            </a:schemeClr>
+          </a:lnRef>
+          <a:fillRef idx="1">
+            <a:schemeClr val="accent1"/>
+          </a:fillRef>
+          <a:effectRef idx="0">
+            <a:schemeClr val="accent1"/>
+          </a:effectRef>
+          <a:fontRef idx="minor">
+            <a:schemeClr val="lt1"/>
+          </a:fontRef>
+        </p:style>
+        <p:txBody>
+          <a:bodyPr rtlCol="0" anchor="ctr"/>
+          <a:lstStyle/>
+          <a:p>
+            <a:pPr algn="ctr"/>
+            <a:endParaRPr lang="en-US"/>
+          </a:p>
+        </p:txBody>
+      </p:sp>
+      <p:pic>
+        <p:nvPicPr>
+          <p:cNvPr id="1026" name="Picture 2" descr="Using Telehealth to Power Patient-Centered Care">
+            <a:extLst>
+              <a:ext uri="{FF2B5EF4-FFF2-40B4-BE49-F238E27FC236}">
+                <a16:creationId xmlns:a16="http://schemas.microsoft.com/office/drawing/2014/main" id="{8183EF0B-7150-544D-9D9D-412DE21919EA}"/>
+              </a:ext>
+            </a:extLst>
+          </p:cNvPr>
+          <p:cNvPicPr>
+            <a:picLocks noChangeAspect="1" noChangeArrowheads="1"/>
+          </p:cNvPicPr>
+          <p:nvPr/>
+        </p:nvPicPr>
+        <p:blipFill>
+          <a:blip r:embed="rId3">
+            <a:extLst>
+              <a:ext uri="{28A0092B-C50C-407E-A947-70E740481C1C}">
+                <a14:useLocalDpi xmlns:a14="http://schemas.microsoft.com/office/drawing/2010/main" val="0"/>
+              </a:ext>
+            </a:extLst>
+          </a:blip>
+          <a:srcRect/>
+          <a:stretch>
+            <a:fillRect/>
+          </a:stretch>
+        </p:blipFill>
+        <p:spPr bwMode="auto">
+          <a:xfrm>
+            <a:off x="7955960" y="5568395"/>
+            <a:ext cx="3081691" cy="1190170"/>
+          </a:xfrm>
+          <a:prstGeom prst="rect">
+            <a:avLst/>
+          </a:prstGeom>
+          <a:noFill/>
+          <a:extLst>
+            <a:ext uri="{909E8E84-426E-40DD-AFC4-6F175D3DCCD1}">
+              <a14:hiddenFill xmlns:a14="http://schemas.microsoft.com/office/drawing/2010/main">
+                <a:solidFill>
+                  <a:srgbClr val="FFFFFF"/>
+                </a:solidFill>
+              </a14:hiddenFill>
+            </a:ext>
+          </a:extLst>
+        </p:spPr>
+      </p:pic>
+      <p:pic>
+        <p:nvPicPr>
+          <p:cNvPr id="1028" name="Picture 4" descr="Download Florida Polytechnic Logo PNG Image with No Background - PNGkey.com">
+            <a:extLst>
+              <a:ext uri="{FF2B5EF4-FFF2-40B4-BE49-F238E27FC236}">
+                <a16:creationId xmlns:a16="http://schemas.microsoft.com/office/drawing/2014/main" id="{4AA15C22-74ED-CF43-8990-3FDB51A26F9F}"/>
+              </a:ext>
+            </a:extLst>
+          </p:cNvPr>
+          <p:cNvPicPr>
+            <a:picLocks noChangeAspect="1" noChangeArrowheads="1"/>
+          </p:cNvPicPr>
+          <p:nvPr/>
+        </p:nvPicPr>
+        <p:blipFill>
+          <a:blip r:embed="rId4">
+            <a:extLst>
+              <a:ext uri="{28A0092B-C50C-407E-A947-70E740481C1C}">
+                <a14:useLocalDpi xmlns:a14="http://schemas.microsoft.com/office/drawing/2010/main" val="0"/>
+              </a:ext>
+            </a:extLst>
+          </a:blip>
+          <a:srcRect/>
+          <a:stretch>
+            <a:fillRect/>
+          </a:stretch>
+        </p:blipFill>
+        <p:spPr bwMode="auto">
+          <a:xfrm>
+            <a:off x="1154349" y="5569543"/>
+            <a:ext cx="4903391" cy="1189022"/>
+          </a:xfrm>
+          <a:prstGeom prst="rect">
+            <a:avLst/>
+          </a:prstGeom>
+          <a:noFill/>
+          <a:extLst>
+            <a:ext uri="{909E8E84-426E-40DD-AFC4-6F175D3DCCD1}">
+              <a14:hiddenFill xmlns:a14="http://schemas.microsoft.com/office/drawing/2010/main">
+                <a:solidFill>
+                  <a:srgbClr val="FFFFFF"/>
+                </a:solidFill>
+              </a14:hiddenFill>
+            </a:ext>
+          </a:extLst>
+        </p:spPr>
+      </p:pic>
     </p:spTree>
     <p:extLst>
       <p:ext uri="{BB962C8B-B14F-4D97-AF65-F5344CB8AC3E}">
-        <p14:creationId xmlns:p14="http://schemas.microsoft.com/office/powerpoint/2010/main" val="3374382721"/>
+        <p14:creationId xmlns:p14="http://schemas.microsoft.com/office/powerpoint/2010/main" val="3717004252"/>
       </p:ext>
     </p:extLst>
   </p:cSld>
   <p:clrMapOvr>
     <a:masterClrMapping/>
   </p:clrMapOvr>
+  <mc:AlternateContent xmlns:mc="http://schemas.openxmlformats.org/markup-compatibility/2006">
+    <mc:Choice xmlns:p14="http://schemas.microsoft.com/office/powerpoint/2010/main" Requires="p14">
+      <p:transition spd="slow" p14:dur="2000" advClick="0"/>
+    </mc:Choice>
+    <mc:Fallback>
+      <p:transition spd="slow" advClick="0"/>
+    </mc:Fallback>
+  </mc:AlternateContent>
 </p:sld>
 </file>
 
@@ -6936,6 +7254,21 @@
 </file>
 
 <file path=customXml/item1.xml><?xml version="1.0" encoding="utf-8"?>
+<p:properties xmlns:p="http://schemas.microsoft.com/office/2006/metadata/properties" xmlns:xsi="http://www.w3.org/2001/XMLSchema-instance" xmlns:pc="http://schemas.microsoft.com/office/infopath/2007/PartnerControls">
+  <documentManagement/>
+</p:properties>
+</file>
+
+<file path=customXml/item2.xml><?xml version="1.0" encoding="utf-8"?>
+<?mso-contentType ?>
+<FormTemplates xmlns="http://schemas.microsoft.com/sharepoint/v3/contenttype/forms">
+  <Display>DocumentLibraryForm</Display>
+  <Edit>DocumentLibraryForm</Edit>
+  <New>DocumentLibraryForm</New>
+</FormTemplates>
+</file>
+
+<file path=customXml/item3.xml><?xml version="1.0" encoding="utf-8"?>
 <ct:contentTypeSchema xmlns:ct="http://schemas.microsoft.com/office/2006/metadata/contentType" xmlns:ma="http://schemas.microsoft.com/office/2006/metadata/properties/metaAttributes" ct:_="" ma:_="" ma:contentTypeName="Document" ma:contentTypeID="0x01010098C2BA364F93A046998B1C38E032169E" ma:contentTypeVersion="2" ma:contentTypeDescription="Create a new document." ma:contentTypeScope="" ma:versionID="ab6f7be23c30548dd496b12d40e56b0e">
   <xsd:schema xmlns:xsd="http://www.w3.org/2001/XMLSchema" xmlns:xs="http://www.w3.org/2001/XMLSchema" xmlns:p="http://schemas.microsoft.com/office/2006/metadata/properties" xmlns:ns2="5ccbf36f-62a2-437b-b88b-0620d7a891d8" targetNamespace="http://schemas.microsoft.com/office/2006/metadata/properties" ma:root="true" ma:fieldsID="b402442e67d956f5ef94921da9f767dc" ns2:_="">
     <xsd:import namespace="5ccbf36f-62a2-437b-b88b-0620d7a891d8"/>
@@ -7067,22 +7400,31 @@
 </ct:contentTypeSchema>
 </file>
 
-<file path=customXml/item2.xml><?xml version="1.0" encoding="utf-8"?>
-<?mso-contentType ?>
-<FormTemplates xmlns="http://schemas.microsoft.com/sharepoint/v3/contenttype/forms">
-  <Display>DocumentLibraryForm</Display>
-  <Edit>DocumentLibraryForm</Edit>
-  <New>DocumentLibraryForm</New>
-</FormTemplates>
+<file path=customXml/itemProps1.xml><?xml version="1.0" encoding="utf-8"?>
+<ds:datastoreItem xmlns:ds="http://schemas.openxmlformats.org/officeDocument/2006/customXml" ds:itemID="{36BB1F44-0AC4-4597-817B-96818129DDD0}">
+  <ds:schemaRefs>
+    <ds:schemaRef ds:uri="5ccbf36f-62a2-437b-b88b-0620d7a891d8"/>
+    <ds:schemaRef ds:uri="http://purl.org/dc/dcmitype/"/>
+    <ds:schemaRef ds:uri="http://purl.org/dc/elements/1.1/"/>
+    <ds:schemaRef ds:uri="http://purl.org/dc/terms/"/>
+    <ds:schemaRef ds:uri="http://schemas.microsoft.com/office/2006/documentManagement/types"/>
+    <ds:schemaRef ds:uri="http://schemas.microsoft.com/office/2006/metadata/properties"/>
+    <ds:schemaRef ds:uri="http://schemas.microsoft.com/office/infopath/2007/PartnerControls"/>
+    <ds:schemaRef ds:uri="http://schemas.openxmlformats.org/package/2006/metadata/core-properties"/>
+    <ds:schemaRef ds:uri="http://www.w3.org/XML/1998/namespace"/>
+  </ds:schemaRefs>
+</ds:datastoreItem>
 </file>
 
-<file path=customXml/item3.xml><?xml version="1.0" encoding="utf-8"?>
-<p:properties xmlns:p="http://schemas.microsoft.com/office/2006/metadata/properties" xmlns:xsi="http://www.w3.org/2001/XMLSchema-instance" xmlns:pc="http://schemas.microsoft.com/office/infopath/2007/PartnerControls">
-  <documentManagement/>
-</p:properties>
+<file path=customXml/itemProps2.xml><?xml version="1.0" encoding="utf-8"?>
+<ds:datastoreItem xmlns:ds="http://schemas.openxmlformats.org/officeDocument/2006/customXml" ds:itemID="{BA0EC30D-B2F4-4B22-A293-484DA3593D66}">
+  <ds:schemaRefs>
+    <ds:schemaRef ds:uri="http://schemas.microsoft.com/sharepoint/v3/contenttype/forms"/>
+  </ds:schemaRefs>
+</ds:datastoreItem>
 </file>
 
-<file path=customXml/itemProps1.xml><?xml version="1.0" encoding="utf-8"?>
+<file path=customXml/itemProps3.xml><?xml version="1.0" encoding="utf-8"?>
 <ds:datastoreItem xmlns:ds="http://schemas.openxmlformats.org/officeDocument/2006/customXml" ds:itemID="{1D0A73FC-E577-4D3F-B08A-D3341121F4E0}">
   <ds:schemaRefs>
     <ds:schemaRef ds:uri="5ccbf36f-62a2-437b-b88b-0620d7a891d8"/>
@@ -7098,28 +7440,4 @@
     <ds:schemaRef ds:uri="http://www.w3.org/2001/XMLSchema"/>
   </ds:schemaRefs>
 </ds:datastoreItem>
-</file>
-
-<file path=customXml/itemProps2.xml><?xml version="1.0" encoding="utf-8"?>
-<ds:datastoreItem xmlns:ds="http://schemas.openxmlformats.org/officeDocument/2006/customXml" ds:itemID="{BA0EC30D-B2F4-4B22-A293-484DA3593D66}">
-  <ds:schemaRefs>
-    <ds:schemaRef ds:uri="http://schemas.microsoft.com/sharepoint/v3/contenttype/forms"/>
-  </ds:schemaRefs>
-</ds:datastoreItem>
-</file>
-
-<file path=customXml/itemProps3.xml><?xml version="1.0" encoding="utf-8"?>
-<ds:datastoreItem xmlns:ds="http://schemas.openxmlformats.org/officeDocument/2006/customXml" ds:itemID="{36BB1F44-0AC4-4597-817B-96818129DDD0}">
-  <ds:schemaRefs>
-    <ds:schemaRef ds:uri="5ccbf36f-62a2-437b-b88b-0620d7a891d8"/>
-    <ds:schemaRef ds:uri="http://purl.org/dc/dcmitype/"/>
-    <ds:schemaRef ds:uri="http://purl.org/dc/elements/1.1/"/>
-    <ds:schemaRef ds:uri="http://purl.org/dc/terms/"/>
-    <ds:schemaRef ds:uri="http://schemas.microsoft.com/office/2006/documentManagement/types"/>
-    <ds:schemaRef ds:uri="http://schemas.microsoft.com/office/2006/metadata/properties"/>
-    <ds:schemaRef ds:uri="http://schemas.microsoft.com/office/infopath/2007/PartnerControls"/>
-    <ds:schemaRef ds:uri="http://schemas.openxmlformats.org/package/2006/metadata/core-properties"/>
-    <ds:schemaRef ds:uri="http://www.w3.org/XML/1998/namespace"/>
-  </ds:schemaRefs>
-</ds:datastoreItem>
 </file>
</xml_diff>

<commit_message>
New slides and classworks
</commit_message>
<xml_diff>
--- a/IDC 4942 ~ Capstone/MidtermPresentation.pptx
+++ b/IDC 4942 ~ Capstone/MidtermPresentation.pptx
@@ -296,7 +296,7 @@
           <a:p>
             <a:fld id="{1160EA64-D806-43AC-9DF2-F8C432F32B4C}" type="datetimeFigureOut">
               <a:rPr lang="en-US" dirty="0"/>
-              <a:t>10/18/21</a:t>
+              <a:t>10/20/21</a:t>
             </a:fld>
             <a:endParaRPr lang="en-US"/>
           </a:p>
@@ -460,7 +460,7 @@
           <a:p>
             <a:fld id="{E9F9C37B-1D36-470B-8223-D6C91242EC14}" type="datetimeFigureOut">
               <a:rPr lang="en-US" dirty="0"/>
-              <a:t>10/18/21</a:t>
+              <a:t>10/20/21</a:t>
             </a:fld>
             <a:endParaRPr lang="en-US"/>
           </a:p>
@@ -633,7 +633,7 @@
           <a:p>
             <a:fld id="{67C6F52A-A82B-47A2-A83A-8C4C91F2D59F}" type="datetimeFigureOut">
               <a:rPr lang="en-US" dirty="0"/>
-              <a:t>10/18/21</a:t>
+              <a:t>10/20/21</a:t>
             </a:fld>
             <a:endParaRPr lang="en-US"/>
           </a:p>
@@ -796,7 +796,7 @@
           <a:p>
             <a:fld id="{F070A7B3-6521-4DCA-87E5-044747A908C1}" type="datetimeFigureOut">
               <a:rPr lang="en-US" dirty="0"/>
-              <a:t>10/18/21</a:t>
+              <a:t>10/20/21</a:t>
             </a:fld>
             <a:endParaRPr lang="en-US"/>
           </a:p>
@@ -1059,7 +1059,7 @@
           <a:p>
             <a:fld id="{1160EA64-D806-43AC-9DF2-F8C432F32B4C}" type="datetimeFigureOut">
               <a:rPr lang="en-US" dirty="0"/>
-              <a:t>10/18/21</a:t>
+              <a:t>10/20/21</a:t>
             </a:fld>
             <a:endParaRPr lang="en-US"/>
           </a:p>
@@ -1284,7 +1284,7 @@
           <a:p>
             <a:fld id="{AB134690-1557-4C89-A502-4959FE7FAD70}" type="datetimeFigureOut">
               <a:rPr lang="en-US" dirty="0"/>
-              <a:t>10/18/21</a:t>
+              <a:t>10/20/21</a:t>
             </a:fld>
             <a:endParaRPr lang="en-US"/>
           </a:p>
@@ -1636,7 +1636,7 @@
           <a:p>
             <a:fld id="{4F7D4976-E339-4826-83B7-FBD03F55ECF8}" type="datetimeFigureOut">
               <a:rPr lang="en-US" dirty="0"/>
-              <a:t>10/18/21</a:t>
+              <a:t>10/20/21</a:t>
             </a:fld>
             <a:endParaRPr lang="en-US"/>
           </a:p>
@@ -1770,7 +1770,7 @@
           <a:p>
             <a:fld id="{E1037C31-9E7A-4F99-8774-A0E530DE1A42}" type="datetimeFigureOut">
               <a:rPr lang="en-US" dirty="0"/>
-              <a:t>10/18/21</a:t>
+              <a:t>10/20/21</a:t>
             </a:fld>
             <a:endParaRPr lang="en-US"/>
           </a:p>
@@ -1860,7 +1860,7 @@
           <a:p>
             <a:fld id="{C278504F-A551-4DE0-9316-4DCD1D8CC752}" type="datetimeFigureOut">
               <a:rPr lang="en-US" dirty="0"/>
-              <a:t>10/18/21</a:t>
+              <a:t>10/20/21</a:t>
             </a:fld>
             <a:endParaRPr lang="en-US"/>
           </a:p>
@@ -2210,7 +2210,7 @@
           <a:p>
             <a:fld id="{D1BE4249-C0D0-4B06-8692-E8BB871AF643}" type="datetimeFigureOut">
               <a:rPr lang="en-US" dirty="0"/>
-              <a:t>10/18/21</a:t>
+              <a:t>10/20/21</a:t>
             </a:fld>
             <a:endParaRPr lang="en-US"/>
           </a:p>
@@ -2560,7 +2560,7 @@
           <a:p>
             <a:fld id="{042B0DB6-F5C7-45FB-8CF3-31B45F9C2DAC}" type="datetimeFigureOut">
               <a:rPr lang="en-US" dirty="0"/>
-              <a:t>10/18/21</a:t>
+              <a:t>10/20/21</a:t>
             </a:fld>
             <a:endParaRPr lang="en-US"/>
           </a:p>
@@ -2795,7 +2795,7 @@
           <a:p>
             <a:fld id="{1160EA64-D806-43AC-9DF2-F8C432F32B4C}" type="datetimeFigureOut">
               <a:rPr lang="en-US" dirty="0"/>
-              <a:t>10/18/21</a:t>
+              <a:t>10/20/21</a:t>
             </a:fld>
             <a:endParaRPr lang="en-US"/>
           </a:p>
@@ -3529,11 +3529,11 @@
   <p:clrMapOvr>
     <a:masterClrMapping/>
   </p:clrMapOvr>
-  <mc:AlternateContent xmlns:mc="http://schemas.openxmlformats.org/markup-compatibility/2006">
-    <mc:Choice xmlns:p14="http://schemas.microsoft.com/office/powerpoint/2010/main" Requires="p14">
+  <mc:AlternateContent xmlns:mc="http://schemas.openxmlformats.org/markup-compatibility/2006" xmlns:p14="http://schemas.microsoft.com/office/powerpoint/2010/main">
+    <mc:Choice Requires="p14">
       <p:transition spd="slow" p14:dur="2000" advClick="0"/>
     </mc:Choice>
-    <mc:Fallback>
+    <mc:Fallback xmlns="">
       <p:transition spd="slow" advClick="0"/>
     </mc:Fallback>
   </mc:AlternateContent>
@@ -5353,11 +5353,11 @@
   <p:clrMapOvr>
     <a:masterClrMapping/>
   </p:clrMapOvr>
-  <mc:AlternateContent xmlns:mc="http://schemas.openxmlformats.org/markup-compatibility/2006">
-    <mc:Choice xmlns:p14="http://schemas.microsoft.com/office/powerpoint/2010/main" Requires="p14">
+  <mc:AlternateContent xmlns:mc="http://schemas.openxmlformats.org/markup-compatibility/2006" xmlns:p14="http://schemas.microsoft.com/office/powerpoint/2010/main">
+    <mc:Choice Requires="p14">
       <p:transition spd="slow" p14:dur="2000" advClick="0"/>
     </mc:Choice>
-    <mc:Fallback>
+    <mc:Fallback xmlns="">
       <p:transition spd="slow" advClick="0"/>
     </mc:Fallback>
   </mc:AlternateContent>
@@ -5729,7 +5729,17 @@
           <a:lstStyle/>
           <a:p>
             <a:r>
-              <a:rPr lang="en-US">
+              <a:rPr lang="en-US" dirty="0">
+                <a:solidFill>
+                  <a:srgbClr val="404040"/>
+                </a:solidFill>
+              </a:rPr>
+              <a:t>TMH: Tallahassee Memorial Hospital</a:t>
+            </a:r>
+          </a:p>
+          <a:p>
+            <a:r>
+              <a:rPr lang="en-US" dirty="0">
                 <a:solidFill>
                   <a:srgbClr val="404040"/>
                 </a:solidFill>
@@ -5739,7 +5749,7 @@
           </a:p>
           <a:p>
             <a:r>
-              <a:rPr lang="en-US">
+              <a:rPr lang="en-US" dirty="0">
                 <a:solidFill>
                   <a:srgbClr val="404040"/>
                 </a:solidFill>
@@ -5749,7 +5759,7 @@
           </a:p>
           <a:p>
             <a:r>
-              <a:rPr lang="en-US">
+              <a:rPr lang="en-US" dirty="0">
                 <a:solidFill>
                   <a:srgbClr val="404040"/>
                 </a:solidFill>
@@ -5758,7 +5768,7 @@
             </a:r>
           </a:p>
           <a:p>
-            <a:endParaRPr lang="en-US">
+            <a:endParaRPr lang="en-US" dirty="0">
               <a:solidFill>
                 <a:srgbClr val="404040"/>
               </a:solidFill>
@@ -7254,21 +7264,6 @@
 </file>
 
 <file path=customXml/item1.xml><?xml version="1.0" encoding="utf-8"?>
-<p:properties xmlns:p="http://schemas.microsoft.com/office/2006/metadata/properties" xmlns:xsi="http://www.w3.org/2001/XMLSchema-instance" xmlns:pc="http://schemas.microsoft.com/office/infopath/2007/PartnerControls">
-  <documentManagement/>
-</p:properties>
-</file>
-
-<file path=customXml/item2.xml><?xml version="1.0" encoding="utf-8"?>
-<?mso-contentType ?>
-<FormTemplates xmlns="http://schemas.microsoft.com/sharepoint/v3/contenttype/forms">
-  <Display>DocumentLibraryForm</Display>
-  <Edit>DocumentLibraryForm</Edit>
-  <New>DocumentLibraryForm</New>
-</FormTemplates>
-</file>
-
-<file path=customXml/item3.xml><?xml version="1.0" encoding="utf-8"?>
 <ct:contentTypeSchema xmlns:ct="http://schemas.microsoft.com/office/2006/metadata/contentType" xmlns:ma="http://schemas.microsoft.com/office/2006/metadata/properties/metaAttributes" ct:_="" ma:_="" ma:contentTypeName="Document" ma:contentTypeID="0x01010098C2BA364F93A046998B1C38E032169E" ma:contentTypeVersion="2" ma:contentTypeDescription="Create a new document." ma:contentTypeScope="" ma:versionID="ab6f7be23c30548dd496b12d40e56b0e">
   <xsd:schema xmlns:xsd="http://www.w3.org/2001/XMLSchema" xmlns:xs="http://www.w3.org/2001/XMLSchema" xmlns:p="http://schemas.microsoft.com/office/2006/metadata/properties" xmlns:ns2="5ccbf36f-62a2-437b-b88b-0620d7a891d8" targetNamespace="http://schemas.microsoft.com/office/2006/metadata/properties" ma:root="true" ma:fieldsID="b402442e67d956f5ef94921da9f767dc" ns2:_="">
     <xsd:import namespace="5ccbf36f-62a2-437b-b88b-0620d7a891d8"/>
@@ -7400,31 +7395,22 @@
 </ct:contentTypeSchema>
 </file>
 
-<file path=customXml/itemProps1.xml><?xml version="1.0" encoding="utf-8"?>
-<ds:datastoreItem xmlns:ds="http://schemas.openxmlformats.org/officeDocument/2006/customXml" ds:itemID="{36BB1F44-0AC4-4597-817B-96818129DDD0}">
-  <ds:schemaRefs>
-    <ds:schemaRef ds:uri="5ccbf36f-62a2-437b-b88b-0620d7a891d8"/>
-    <ds:schemaRef ds:uri="http://purl.org/dc/dcmitype/"/>
-    <ds:schemaRef ds:uri="http://purl.org/dc/elements/1.1/"/>
-    <ds:schemaRef ds:uri="http://purl.org/dc/terms/"/>
-    <ds:schemaRef ds:uri="http://schemas.microsoft.com/office/2006/documentManagement/types"/>
-    <ds:schemaRef ds:uri="http://schemas.microsoft.com/office/2006/metadata/properties"/>
-    <ds:schemaRef ds:uri="http://schemas.microsoft.com/office/infopath/2007/PartnerControls"/>
-    <ds:schemaRef ds:uri="http://schemas.openxmlformats.org/package/2006/metadata/core-properties"/>
-    <ds:schemaRef ds:uri="http://www.w3.org/XML/1998/namespace"/>
-  </ds:schemaRefs>
-</ds:datastoreItem>
+<file path=customXml/item2.xml><?xml version="1.0" encoding="utf-8"?>
+<?mso-contentType ?>
+<FormTemplates xmlns="http://schemas.microsoft.com/sharepoint/v3/contenttype/forms">
+  <Display>DocumentLibraryForm</Display>
+  <Edit>DocumentLibraryForm</Edit>
+  <New>DocumentLibraryForm</New>
+</FormTemplates>
 </file>
 
-<file path=customXml/itemProps2.xml><?xml version="1.0" encoding="utf-8"?>
-<ds:datastoreItem xmlns:ds="http://schemas.openxmlformats.org/officeDocument/2006/customXml" ds:itemID="{BA0EC30D-B2F4-4B22-A293-484DA3593D66}">
-  <ds:schemaRefs>
-    <ds:schemaRef ds:uri="http://schemas.microsoft.com/sharepoint/v3/contenttype/forms"/>
-  </ds:schemaRefs>
-</ds:datastoreItem>
+<file path=customXml/item3.xml><?xml version="1.0" encoding="utf-8"?>
+<p:properties xmlns:p="http://schemas.microsoft.com/office/2006/metadata/properties" xmlns:xsi="http://www.w3.org/2001/XMLSchema-instance" xmlns:pc="http://schemas.microsoft.com/office/infopath/2007/PartnerControls">
+  <documentManagement/>
+</p:properties>
 </file>
 
-<file path=customXml/itemProps3.xml><?xml version="1.0" encoding="utf-8"?>
+<file path=customXml/itemProps1.xml><?xml version="1.0" encoding="utf-8"?>
 <ds:datastoreItem xmlns:ds="http://schemas.openxmlformats.org/officeDocument/2006/customXml" ds:itemID="{1D0A73FC-E577-4D3F-B08A-D3341121F4E0}">
   <ds:schemaRefs>
     <ds:schemaRef ds:uri="5ccbf36f-62a2-437b-b88b-0620d7a891d8"/>
@@ -7440,4 +7426,28 @@
     <ds:schemaRef ds:uri="http://www.w3.org/2001/XMLSchema"/>
   </ds:schemaRefs>
 </ds:datastoreItem>
+</file>
+
+<file path=customXml/itemProps2.xml><?xml version="1.0" encoding="utf-8"?>
+<ds:datastoreItem xmlns:ds="http://schemas.openxmlformats.org/officeDocument/2006/customXml" ds:itemID="{BA0EC30D-B2F4-4B22-A293-484DA3593D66}">
+  <ds:schemaRefs>
+    <ds:schemaRef ds:uri="http://schemas.microsoft.com/sharepoint/v3/contenttype/forms"/>
+  </ds:schemaRefs>
+</ds:datastoreItem>
+</file>
+
+<file path=customXml/itemProps3.xml><?xml version="1.0" encoding="utf-8"?>
+<ds:datastoreItem xmlns:ds="http://schemas.openxmlformats.org/officeDocument/2006/customXml" ds:itemID="{36BB1F44-0AC4-4597-817B-96818129DDD0}">
+  <ds:schemaRefs>
+    <ds:schemaRef ds:uri="5ccbf36f-62a2-437b-b88b-0620d7a891d8"/>
+    <ds:schemaRef ds:uri="http://purl.org/dc/dcmitype/"/>
+    <ds:schemaRef ds:uri="http://purl.org/dc/elements/1.1/"/>
+    <ds:schemaRef ds:uri="http://purl.org/dc/terms/"/>
+    <ds:schemaRef ds:uri="http://schemas.microsoft.com/office/2006/documentManagement/types"/>
+    <ds:schemaRef ds:uri="http://schemas.microsoft.com/office/2006/metadata/properties"/>
+    <ds:schemaRef ds:uri="http://schemas.microsoft.com/office/infopath/2007/PartnerControls"/>
+    <ds:schemaRef ds:uri="http://schemas.openxmlformats.org/package/2006/metadata/core-properties"/>
+    <ds:schemaRef ds:uri="http://www.w3.org/XML/1998/namespace"/>
+  </ds:schemaRefs>
+</ds:datastoreItem>
 </file>
</xml_diff>